<commit_message>
Adding iot events diagra
</commit_message>
<xml_diff>
--- a/docs/diagrams.pptx
+++ b/docs/diagrams.pptx
@@ -5,15 +5,16 @@
     <p:sldMasterId id="2147483674" r:id="rId4"/>
   </p:sldMasterIdLst>
   <p:notesMasterIdLst>
-    <p:notesMasterId r:id="rId8"/>
+    <p:notesMasterId r:id="rId9"/>
   </p:notesMasterIdLst>
   <p:handoutMasterIdLst>
-    <p:handoutMasterId r:id="rId9"/>
+    <p:handoutMasterId r:id="rId10"/>
   </p:handoutMasterIdLst>
   <p:sldIdLst>
     <p:sldId id="285" r:id="rId5"/>
     <p:sldId id="286" r:id="rId6"/>
     <p:sldId id="289" r:id="rId7"/>
+    <p:sldId id="290" r:id="rId8"/>
   </p:sldIdLst>
   <p:sldSz cx="14630400" cy="8229600"/>
   <p:notesSz cx="6858000" cy="9144000"/>
@@ -360,7 +361,7 @@
           <a:p>
             <a:fld id="{D2887149-AF03-6142-908A-3DD284EAF54B}" type="datetimeFigureOut">
               <a:rPr lang="en-US" smtClean="0"/>
-              <a:t>8/8/19</a:t>
+              <a:t>9/3/19</a:t>
             </a:fld>
             <a:endParaRPr lang="en-US"/>
           </a:p>
@@ -542,7 +543,7 @@
             <a:fld id="{0B25AC41-3BEC-9247-8322-91B80C013F2D}" type="datetimeFigureOut">
               <a:rPr lang="en-US" smtClean="0"/>
               <a:pPr/>
-              <a:t>8/8/19</a:t>
+              <a:t>9/3/19</a:t>
             </a:fld>
             <a:endParaRPr lang="en-US" dirty="0"/>
           </a:p>
@@ -13603,6 +13604,812 @@
     <p:extLst>
       <p:ext uri="{BB962C8B-B14F-4D97-AF65-F5344CB8AC3E}">
         <p14:creationId xmlns:p14="http://schemas.microsoft.com/office/powerpoint/2010/main" val="3484187057"/>
+      </p:ext>
+    </p:extLst>
+  </p:cSld>
+  <p:clrMapOvr>
+    <a:masterClrMapping/>
+  </p:clrMapOvr>
+</p:sld>
+</file>
+
+<file path=ppt/slides/slide4.xml><?xml version="1.0" encoding="utf-8"?>
+<p:sld xmlns:a="http://schemas.openxmlformats.org/drawingml/2006/main" xmlns:r="http://schemas.openxmlformats.org/officeDocument/2006/relationships" xmlns:p="http://schemas.openxmlformats.org/presentationml/2006/main">
+  <p:cSld>
+    <p:spTree>
+      <p:nvGrpSpPr>
+        <p:cNvPr id="1" name=""/>
+        <p:cNvGrpSpPr/>
+        <p:nvPr/>
+      </p:nvGrpSpPr>
+      <p:grpSpPr>
+        <a:xfrm>
+          <a:off x="0" y="0"/>
+          <a:ext cx="0" cy="0"/>
+          <a:chOff x="0" y="0"/>
+          <a:chExt cx="0" cy="0"/>
+        </a:xfrm>
+      </p:grpSpPr>
+      <p:sp>
+        <p:nvSpPr>
+          <p:cNvPr id="2" name="Title 1">
+            <a:extLst>
+              <a:ext uri="{FF2B5EF4-FFF2-40B4-BE49-F238E27FC236}">
+                <a16:creationId xmlns:a16="http://schemas.microsoft.com/office/drawing/2014/main" id="{4D1F619E-01B3-924E-9D2A-F7F832D56A20}"/>
+              </a:ext>
+            </a:extLst>
+          </p:cNvPr>
+          <p:cNvSpPr>
+            <a:spLocks noGrp="1"/>
+          </p:cNvSpPr>
+          <p:nvPr>
+            <p:ph type="title"/>
+          </p:nvPr>
+        </p:nvSpPr>
+        <p:spPr/>
+        <p:txBody>
+          <a:bodyPr/>
+          <a:lstStyle/>
+          <a:p>
+            <a:r>
+              <a:rPr lang="en-US" dirty="0"/>
+              <a:t>Tank Level Detector Model</a:t>
+            </a:r>
+          </a:p>
+        </p:txBody>
+      </p:sp>
+      <p:pic>
+        <p:nvPicPr>
+          <p:cNvPr id="4" name="Picture 3">
+            <a:extLst>
+              <a:ext uri="{FF2B5EF4-FFF2-40B4-BE49-F238E27FC236}">
+                <a16:creationId xmlns:a16="http://schemas.microsoft.com/office/drawing/2014/main" id="{1AFAC959-3307-BD43-8B5E-7C0E7CA948AE}"/>
+              </a:ext>
+            </a:extLst>
+          </p:cNvPr>
+          <p:cNvPicPr>
+            <a:picLocks noChangeAspect="1"/>
+          </p:cNvPicPr>
+          <p:nvPr/>
+        </p:nvPicPr>
+        <p:blipFill>
+          <a:blip r:embed="rId2"/>
+          <a:stretch>
+            <a:fillRect/>
+          </a:stretch>
+        </p:blipFill>
+        <p:spPr>
+          <a:xfrm>
+            <a:off x="1219200" y="3399364"/>
+            <a:ext cx="12192000" cy="3022600"/>
+          </a:xfrm>
+          <a:prstGeom prst="rect">
+            <a:avLst/>
+          </a:prstGeom>
+        </p:spPr>
+      </p:pic>
+      <p:sp>
+        <p:nvSpPr>
+          <p:cNvPr id="5" name="TextBox 4">
+            <a:extLst>
+              <a:ext uri="{FF2B5EF4-FFF2-40B4-BE49-F238E27FC236}">
+                <a16:creationId xmlns:a16="http://schemas.microsoft.com/office/drawing/2014/main" id="{A6739EBD-2571-CC4F-A461-C4789A1E6A1E}"/>
+              </a:ext>
+            </a:extLst>
+          </p:cNvPr>
+          <p:cNvSpPr txBox="1"/>
+          <p:nvPr/>
+        </p:nvSpPr>
+        <p:spPr>
+          <a:xfrm>
+            <a:off x="1152142" y="1006284"/>
+            <a:ext cx="3735318" cy="1384995"/>
+          </a:xfrm>
+          <a:prstGeom prst="rect">
+            <a:avLst/>
+          </a:prstGeom>
+          <a:noFill/>
+          <a:ln>
+            <a:solidFill>
+              <a:schemeClr val="accent1"/>
+            </a:solidFill>
+          </a:ln>
+        </p:spPr>
+        <p:txBody>
+          <a:bodyPr wrap="none" rtlCol="0">
+            <a:spAutoFit/>
+          </a:bodyPr>
+          <a:lstStyle/>
+          <a:p>
+            <a:pPr algn="l"/>
+            <a:r>
+              <a:rPr lang="en-US" sz="1200" b="1" dirty="0">
+                <a:solidFill>
+                  <a:schemeClr val="accent1"/>
+                </a:solidFill>
+                <a:latin typeface="Amazon Ember" panose="020B0603020204020204" pitchFamily="34" charset="0"/>
+                <a:ea typeface="Amazon Ember" panose="020B0603020204020204" pitchFamily="34" charset="0"/>
+                <a:cs typeface="Amazon Ember" panose="020B0603020204020204" pitchFamily="34" charset="0"/>
+              </a:rPr>
+              <a:t>OnEnter, setVariables:</a:t>
+            </a:r>
+          </a:p>
+          <a:p>
+            <a:pPr algn="l"/>
+            <a:r>
+              <a:rPr lang="en-US" sz="1200" dirty="0">
+                <a:latin typeface="Amazon Ember" panose="020B0603020204020204" pitchFamily="34" charset="0"/>
+                <a:ea typeface="Amazon Ember" panose="020B0603020204020204" pitchFamily="34" charset="0"/>
+                <a:cs typeface="Amazon Ember" panose="020B0603020204020204" pitchFamily="34" charset="0"/>
+              </a:rPr>
+              <a:t>maxThreshold = 85</a:t>
+            </a:r>
+          </a:p>
+          <a:p>
+            <a:r>
+              <a:rPr lang="en-US" sz="1200" dirty="0">
+                <a:latin typeface="Amazon Ember" panose="020B0603020204020204" pitchFamily="34" charset="0"/>
+                <a:ea typeface="Amazon Ember" panose="020B0603020204020204" pitchFamily="34" charset="0"/>
+                <a:cs typeface="Amazon Ember" panose="020B0603020204020204" pitchFamily="34" charset="0"/>
+              </a:rPr>
+              <a:t>maxThresholdExceeded = false</a:t>
+            </a:r>
+          </a:p>
+          <a:p>
+            <a:r>
+              <a:rPr lang="en-US" sz="1200" dirty="0">
+                <a:latin typeface="Amazon Ember" panose="020B0603020204020204" pitchFamily="34" charset="0"/>
+                <a:ea typeface="Amazon Ember" panose="020B0603020204020204" pitchFamily="34" charset="0"/>
+                <a:cs typeface="Amazon Ember" panose="020B0603020204020204" pitchFamily="34" charset="0"/>
+              </a:rPr>
+              <a:t>tankLevel = $input.tankLevel.sensorData.tankLevel</a:t>
+            </a:r>
+          </a:p>
+          <a:p>
+            <a:endParaRPr lang="en-US" sz="1200" dirty="0">
+              <a:latin typeface="Amazon Ember" panose="020B0603020204020204" pitchFamily="34" charset="0"/>
+              <a:ea typeface="Amazon Ember" panose="020B0603020204020204" pitchFamily="34" charset="0"/>
+              <a:cs typeface="Amazon Ember" panose="020B0603020204020204" pitchFamily="34" charset="0"/>
+            </a:endParaRPr>
+          </a:p>
+          <a:p>
+            <a:r>
+              <a:rPr lang="en-US" sz="1200" b="1" dirty="0">
+                <a:solidFill>
+                  <a:schemeClr val="accent1"/>
+                </a:solidFill>
+                <a:latin typeface="Amazon Ember" panose="020B0603020204020204" pitchFamily="34" charset="0"/>
+                <a:ea typeface="Amazon Ember" panose="020B0603020204020204" pitchFamily="34" charset="0"/>
+                <a:cs typeface="Amazon Ember" panose="020B0603020204020204" pitchFamily="34" charset="0"/>
+              </a:rPr>
+              <a:t>OnInput setVariables:</a:t>
+            </a:r>
+          </a:p>
+          <a:p>
+            <a:r>
+              <a:rPr lang="en-US" sz="1200" dirty="0">
+                <a:latin typeface="Amazon Ember" panose="020B0603020204020204" pitchFamily="34" charset="0"/>
+                <a:ea typeface="Amazon Ember" panose="020B0603020204020204" pitchFamily="34" charset="0"/>
+                <a:cs typeface="Amazon Ember" panose="020B0603020204020204" pitchFamily="34" charset="0"/>
+              </a:rPr>
+              <a:t>tankLevel = $input.tankLevel.sensorData.tankLevel</a:t>
+            </a:r>
+          </a:p>
+        </p:txBody>
+      </p:sp>
+      <p:cxnSp>
+        <p:nvCxnSpPr>
+          <p:cNvPr id="8" name="Straight Connector 7">
+            <a:extLst>
+              <a:ext uri="{FF2B5EF4-FFF2-40B4-BE49-F238E27FC236}">
+                <a16:creationId xmlns:a16="http://schemas.microsoft.com/office/drawing/2014/main" id="{914EB91A-3B48-1440-9686-492EECA068A5}"/>
+              </a:ext>
+            </a:extLst>
+          </p:cNvPr>
+          <p:cNvCxnSpPr>
+            <a:cxnSpLocks/>
+            <a:stCxn id="5" idx="2"/>
+          </p:cNvCxnSpPr>
+          <p:nvPr/>
+        </p:nvCxnSpPr>
+        <p:spPr>
+          <a:xfrm rot="16200000" flipH="1">
+            <a:off x="2398832" y="3012248"/>
+            <a:ext cx="2519385" cy="1277446"/>
+          </a:xfrm>
+          <a:prstGeom prst="bentConnector3">
+            <a:avLst>
+              <a:gd name="adj1" fmla="val 99737"/>
+            </a:avLst>
+          </a:prstGeom>
+        </p:spPr>
+        <p:style>
+          <a:lnRef idx="2">
+            <a:schemeClr val="accent1"/>
+          </a:lnRef>
+          <a:fillRef idx="0">
+            <a:schemeClr val="accent1"/>
+          </a:fillRef>
+          <a:effectRef idx="1">
+            <a:schemeClr val="accent1"/>
+          </a:effectRef>
+          <a:fontRef idx="minor">
+            <a:schemeClr val="tx1"/>
+          </a:fontRef>
+        </p:style>
+      </p:cxnSp>
+      <p:sp>
+        <p:nvSpPr>
+          <p:cNvPr id="16" name="TextBox 15">
+            <a:extLst>
+              <a:ext uri="{FF2B5EF4-FFF2-40B4-BE49-F238E27FC236}">
+                <a16:creationId xmlns:a16="http://schemas.microsoft.com/office/drawing/2014/main" id="{20F53E02-1CE1-E947-91FA-63F56838D196}"/>
+              </a:ext>
+            </a:extLst>
+          </p:cNvPr>
+          <p:cNvSpPr txBox="1"/>
+          <p:nvPr/>
+        </p:nvSpPr>
+        <p:spPr>
+          <a:xfrm>
+            <a:off x="7043838" y="980882"/>
+            <a:ext cx="7015062" cy="1200329"/>
+          </a:xfrm>
+          <a:prstGeom prst="rect">
+            <a:avLst/>
+          </a:prstGeom>
+          <a:noFill/>
+          <a:ln>
+            <a:solidFill>
+              <a:schemeClr val="accent1"/>
+            </a:solidFill>
+          </a:ln>
+        </p:spPr>
+        <p:txBody>
+          <a:bodyPr wrap="none" rtlCol="0">
+            <a:spAutoFit/>
+          </a:bodyPr>
+          <a:lstStyle/>
+          <a:p>
+            <a:pPr algn="l"/>
+            <a:r>
+              <a:rPr lang="en-US" sz="1200" b="1" dirty="0">
+                <a:solidFill>
+                  <a:schemeClr val="accent1"/>
+                </a:solidFill>
+                <a:latin typeface="Amazon Ember" panose="020B0603020204020204" pitchFamily="34" charset="0"/>
+                <a:ea typeface="Amazon Ember" panose="020B0603020204020204" pitchFamily="34" charset="0"/>
+                <a:cs typeface="Amazon Ember" panose="020B0603020204020204" pitchFamily="34" charset="0"/>
+              </a:rPr>
+              <a:t>OnEnter, Publish IoT Topic:</a:t>
+            </a:r>
+          </a:p>
+          <a:p>
+            <a:r>
+              <a:rPr lang="en-US" sz="1200" dirty="0">
+                <a:latin typeface="Amazon Ember" panose="020B0603020204020204" pitchFamily="34" charset="0"/>
+                <a:ea typeface="Amazon Ember" panose="020B0603020204020204" pitchFamily="34" charset="0"/>
+                <a:cs typeface="Amazon Ember" panose="020B0603020204020204" pitchFamily="34" charset="0"/>
+              </a:rPr>
+              <a:t>Topic: tanks/tankLevelEvent</a:t>
+            </a:r>
+          </a:p>
+          <a:p>
+            <a:endParaRPr lang="en-US" sz="1200" dirty="0">
+              <a:latin typeface="Amazon Ember" panose="020B0603020204020204" pitchFamily="34" charset="0"/>
+              <a:ea typeface="Amazon Ember" panose="020B0603020204020204" pitchFamily="34" charset="0"/>
+              <a:cs typeface="Amazon Ember" panose="020B0603020204020204" pitchFamily="34" charset="0"/>
+            </a:endParaRPr>
+          </a:p>
+          <a:p>
+            <a:r>
+              <a:rPr lang="en-US" sz="1200" b="1" dirty="0">
+                <a:solidFill>
+                  <a:schemeClr val="accent1"/>
+                </a:solidFill>
+                <a:latin typeface="Amazon Ember" panose="020B0603020204020204" pitchFamily="34" charset="0"/>
+                <a:ea typeface="Amazon Ember" panose="020B0603020204020204" pitchFamily="34" charset="0"/>
+                <a:cs typeface="Amazon Ember" panose="020B0603020204020204" pitchFamily="34" charset="0"/>
+              </a:rPr>
+              <a:t>OnInput setVariables:</a:t>
+            </a:r>
+          </a:p>
+          <a:p>
+            <a:r>
+              <a:rPr lang="en-US" sz="1200" dirty="0">
+                <a:latin typeface="Amazon Ember" panose="020B0603020204020204" pitchFamily="34" charset="0"/>
+                <a:ea typeface="Amazon Ember" panose="020B0603020204020204" pitchFamily="34" charset="0"/>
+                <a:cs typeface="Amazon Ember" panose="020B0603020204020204" pitchFamily="34" charset="0"/>
+              </a:rPr>
+              <a:t>tankLevel = $input.tankLevel.sensorData.tankLevel</a:t>
+            </a:r>
+          </a:p>
+          <a:p>
+            <a:r>
+              <a:rPr lang="en-US" sz="1200" dirty="0">
+                <a:latin typeface="Amazon Ember" panose="020B0603020204020204" pitchFamily="34" charset="0"/>
+                <a:ea typeface="Amazon Ember" panose="020B0603020204020204" pitchFamily="34" charset="0"/>
+                <a:cs typeface="Amazon Ember" panose="020B0603020204020204" pitchFamily="34" charset="0"/>
+              </a:rPr>
+              <a:t>maxThresholdExceeded = true if $input.tankLevel.sensorData.tankLevel &gt; $variable.maxThreshold</a:t>
+            </a:r>
+          </a:p>
+        </p:txBody>
+      </p:sp>
+      <p:cxnSp>
+        <p:nvCxnSpPr>
+          <p:cNvPr id="18" name="Straight Connector 7">
+            <a:extLst>
+              <a:ext uri="{FF2B5EF4-FFF2-40B4-BE49-F238E27FC236}">
+                <a16:creationId xmlns:a16="http://schemas.microsoft.com/office/drawing/2014/main" id="{34B96C2A-18C2-2140-81DD-555329164268}"/>
+              </a:ext>
+            </a:extLst>
+          </p:cNvPr>
+          <p:cNvCxnSpPr>
+            <a:cxnSpLocks/>
+            <a:stCxn id="34" idx="2"/>
+          </p:cNvCxnSpPr>
+          <p:nvPr/>
+        </p:nvCxnSpPr>
+        <p:spPr>
+          <a:xfrm rot="16200000" flipH="1">
+            <a:off x="5038452" y="2739075"/>
+            <a:ext cx="2878654" cy="1024260"/>
+          </a:xfrm>
+          <a:prstGeom prst="bentConnector3">
+            <a:avLst>
+              <a:gd name="adj1" fmla="val 50000"/>
+            </a:avLst>
+          </a:prstGeom>
+        </p:spPr>
+        <p:style>
+          <a:lnRef idx="2">
+            <a:schemeClr val="accent1"/>
+          </a:lnRef>
+          <a:fillRef idx="0">
+            <a:schemeClr val="accent1"/>
+          </a:fillRef>
+          <a:effectRef idx="1">
+            <a:schemeClr val="accent1"/>
+          </a:effectRef>
+          <a:fontRef idx="minor">
+            <a:schemeClr val="tx1"/>
+          </a:fontRef>
+        </p:style>
+      </p:cxnSp>
+      <p:cxnSp>
+        <p:nvCxnSpPr>
+          <p:cNvPr id="24" name="Straight Connector 7">
+            <a:extLst>
+              <a:ext uri="{FF2B5EF4-FFF2-40B4-BE49-F238E27FC236}">
+                <a16:creationId xmlns:a16="http://schemas.microsoft.com/office/drawing/2014/main" id="{2931C5F9-D880-CD4E-B760-423ABA78B88F}"/>
+              </a:ext>
+            </a:extLst>
+          </p:cNvPr>
+          <p:cNvCxnSpPr>
+            <a:cxnSpLocks/>
+          </p:cNvCxnSpPr>
+          <p:nvPr/>
+        </p:nvCxnSpPr>
+        <p:spPr>
+          <a:xfrm>
+            <a:off x="8597833" y="2181210"/>
+            <a:ext cx="0" cy="1730390"/>
+          </a:xfrm>
+          <a:prstGeom prst="straightConnector1">
+            <a:avLst/>
+          </a:prstGeom>
+        </p:spPr>
+        <p:style>
+          <a:lnRef idx="2">
+            <a:schemeClr val="accent1"/>
+          </a:lnRef>
+          <a:fillRef idx="0">
+            <a:schemeClr val="accent1"/>
+          </a:fillRef>
+          <a:effectRef idx="1">
+            <a:schemeClr val="accent1"/>
+          </a:effectRef>
+          <a:fontRef idx="minor">
+            <a:schemeClr val="tx1"/>
+          </a:fontRef>
+        </p:style>
+      </p:cxnSp>
+      <p:sp>
+        <p:nvSpPr>
+          <p:cNvPr id="31" name="TextBox 30">
+            <a:extLst>
+              <a:ext uri="{FF2B5EF4-FFF2-40B4-BE49-F238E27FC236}">
+                <a16:creationId xmlns:a16="http://schemas.microsoft.com/office/drawing/2014/main" id="{CB41A143-AE3F-B244-874F-1235CD7F7C43}"/>
+              </a:ext>
+            </a:extLst>
+          </p:cNvPr>
+          <p:cNvSpPr txBox="1"/>
+          <p:nvPr/>
+        </p:nvSpPr>
+        <p:spPr>
+          <a:xfrm>
+            <a:off x="8906981" y="2275237"/>
+            <a:ext cx="4732386" cy="461665"/>
+          </a:xfrm>
+          <a:prstGeom prst="rect">
+            <a:avLst/>
+          </a:prstGeom>
+          <a:noFill/>
+          <a:ln>
+            <a:solidFill>
+              <a:schemeClr val="accent1"/>
+            </a:solidFill>
+          </a:ln>
+        </p:spPr>
+        <p:txBody>
+          <a:bodyPr wrap="none" rtlCol="0">
+            <a:spAutoFit/>
+          </a:bodyPr>
+          <a:lstStyle/>
+          <a:p>
+            <a:pPr algn="l"/>
+            <a:r>
+              <a:rPr lang="en-US" sz="1200" b="1" dirty="0">
+                <a:solidFill>
+                  <a:schemeClr val="accent1"/>
+                </a:solidFill>
+                <a:latin typeface="Amazon Ember" panose="020B0603020204020204" pitchFamily="34" charset="0"/>
+                <a:ea typeface="Amazon Ember" panose="020B0603020204020204" pitchFamily="34" charset="0"/>
+                <a:cs typeface="Amazon Ember" panose="020B0603020204020204" pitchFamily="34" charset="0"/>
+              </a:rPr>
+              <a:t>Event trigger logic:</a:t>
+            </a:r>
+          </a:p>
+          <a:p>
+            <a:r>
+              <a:rPr lang="en-US" sz="1200" dirty="0">
+                <a:latin typeface="Amazon Ember" panose="020B0603020204020204" pitchFamily="34" charset="0"/>
+                <a:ea typeface="Amazon Ember" panose="020B0603020204020204" pitchFamily="34" charset="0"/>
+                <a:cs typeface="Amazon Ember" panose="020B0603020204020204" pitchFamily="34" charset="0"/>
+              </a:rPr>
+              <a:t>$input.tankLevel.sensorData.tankLevel &gt; $variable.maxThreshold</a:t>
+            </a:r>
+          </a:p>
+        </p:txBody>
+      </p:sp>
+      <p:cxnSp>
+        <p:nvCxnSpPr>
+          <p:cNvPr id="32" name="Straight Connector 7">
+            <a:extLst>
+              <a:ext uri="{FF2B5EF4-FFF2-40B4-BE49-F238E27FC236}">
+                <a16:creationId xmlns:a16="http://schemas.microsoft.com/office/drawing/2014/main" id="{905CECC2-AE47-F94D-AF6D-210DF59C94DE}"/>
+              </a:ext>
+            </a:extLst>
+          </p:cNvPr>
+          <p:cNvCxnSpPr>
+            <a:cxnSpLocks/>
+          </p:cNvCxnSpPr>
+          <p:nvPr/>
+        </p:nvCxnSpPr>
+        <p:spPr>
+          <a:xfrm>
+            <a:off x="10305983" y="2736902"/>
+            <a:ext cx="0" cy="787348"/>
+          </a:xfrm>
+          <a:prstGeom prst="straightConnector1">
+            <a:avLst/>
+          </a:prstGeom>
+        </p:spPr>
+        <p:style>
+          <a:lnRef idx="2">
+            <a:schemeClr val="accent1"/>
+          </a:lnRef>
+          <a:fillRef idx="0">
+            <a:schemeClr val="accent1"/>
+          </a:fillRef>
+          <a:effectRef idx="1">
+            <a:schemeClr val="accent1"/>
+          </a:effectRef>
+          <a:fontRef idx="minor">
+            <a:schemeClr val="tx1"/>
+          </a:fontRef>
+        </p:style>
+      </p:cxnSp>
+      <p:sp>
+        <p:nvSpPr>
+          <p:cNvPr id="34" name="TextBox 33">
+            <a:extLst>
+              <a:ext uri="{FF2B5EF4-FFF2-40B4-BE49-F238E27FC236}">
+                <a16:creationId xmlns:a16="http://schemas.microsoft.com/office/drawing/2014/main" id="{356A5452-11BD-8048-9E00-4FFFC68409CC}"/>
+              </a:ext>
+            </a:extLst>
+          </p:cNvPr>
+          <p:cNvSpPr txBox="1"/>
+          <p:nvPr/>
+        </p:nvSpPr>
+        <p:spPr>
+          <a:xfrm>
+            <a:off x="5184025" y="1350213"/>
+            <a:ext cx="1563248" cy="461665"/>
+          </a:xfrm>
+          <a:prstGeom prst="rect">
+            <a:avLst/>
+          </a:prstGeom>
+          <a:noFill/>
+          <a:ln>
+            <a:solidFill>
+              <a:schemeClr val="accent1"/>
+            </a:solidFill>
+          </a:ln>
+        </p:spPr>
+        <p:txBody>
+          <a:bodyPr wrap="none" rtlCol="0">
+            <a:spAutoFit/>
+          </a:bodyPr>
+          <a:lstStyle/>
+          <a:p>
+            <a:pPr algn="l"/>
+            <a:r>
+              <a:rPr lang="en-US" sz="1200" b="1" dirty="0">
+                <a:solidFill>
+                  <a:schemeClr val="accent1"/>
+                </a:solidFill>
+                <a:latin typeface="Amazon Ember" panose="020B0603020204020204" pitchFamily="34" charset="0"/>
+                <a:ea typeface="Amazon Ember" panose="020B0603020204020204" pitchFamily="34" charset="0"/>
+                <a:cs typeface="Amazon Ember" panose="020B0603020204020204" pitchFamily="34" charset="0"/>
+              </a:rPr>
+              <a:t>Event trigger logic:</a:t>
+            </a:r>
+          </a:p>
+          <a:p>
+            <a:r>
+              <a:rPr lang="en-US" sz="1200" dirty="0">
+                <a:latin typeface="Amazon Ember" panose="020B0603020204020204" pitchFamily="34" charset="0"/>
+                <a:ea typeface="Amazon Ember" panose="020B0603020204020204" pitchFamily="34" charset="0"/>
+                <a:cs typeface="Amazon Ember" panose="020B0603020204020204" pitchFamily="34" charset="0"/>
+              </a:rPr>
+              <a:t>true</a:t>
+            </a:r>
+          </a:p>
+        </p:txBody>
+      </p:sp>
+      <p:sp>
+        <p:nvSpPr>
+          <p:cNvPr id="36" name="TextBox 35">
+            <a:extLst>
+              <a:ext uri="{FF2B5EF4-FFF2-40B4-BE49-F238E27FC236}">
+                <a16:creationId xmlns:a16="http://schemas.microsoft.com/office/drawing/2014/main" id="{6845EEAD-BA62-D345-8BC5-45254126B84E}"/>
+              </a:ext>
+            </a:extLst>
+          </p:cNvPr>
+          <p:cNvSpPr txBox="1"/>
+          <p:nvPr/>
+        </p:nvSpPr>
+        <p:spPr>
+          <a:xfrm>
+            <a:off x="914406" y="6604701"/>
+            <a:ext cx="4822154" cy="461665"/>
+          </a:xfrm>
+          <a:prstGeom prst="rect">
+            <a:avLst/>
+          </a:prstGeom>
+          <a:noFill/>
+          <a:ln>
+            <a:solidFill>
+              <a:schemeClr val="accent1"/>
+            </a:solidFill>
+          </a:ln>
+        </p:spPr>
+        <p:txBody>
+          <a:bodyPr wrap="none" rtlCol="0">
+            <a:spAutoFit/>
+          </a:bodyPr>
+          <a:lstStyle/>
+          <a:p>
+            <a:pPr algn="l"/>
+            <a:r>
+              <a:rPr lang="en-US" sz="1200" b="1" dirty="0">
+                <a:solidFill>
+                  <a:schemeClr val="accent1"/>
+                </a:solidFill>
+                <a:latin typeface="Amazon Ember" panose="020B0603020204020204" pitchFamily="34" charset="0"/>
+                <a:ea typeface="Amazon Ember" panose="020B0603020204020204" pitchFamily="34" charset="0"/>
+                <a:cs typeface="Amazon Ember" panose="020B0603020204020204" pitchFamily="34" charset="0"/>
+              </a:rPr>
+              <a:t>Event trigger logic:</a:t>
+            </a:r>
+          </a:p>
+          <a:p>
+            <a:r>
+              <a:rPr lang="en-US" sz="1200" dirty="0">
+                <a:latin typeface="Amazon Ember" panose="020B0603020204020204" pitchFamily="34" charset="0"/>
+                <a:ea typeface="Amazon Ember" panose="020B0603020204020204" pitchFamily="34" charset="0"/>
+                <a:cs typeface="Amazon Ember" panose="020B0603020204020204" pitchFamily="34" charset="0"/>
+              </a:rPr>
+              <a:t>$input.tankLevel.sensorData.tankLevel &lt;= $variable.maxThreshold</a:t>
+            </a:r>
+          </a:p>
+        </p:txBody>
+      </p:sp>
+      <p:cxnSp>
+        <p:nvCxnSpPr>
+          <p:cNvPr id="37" name="Straight Connector 7">
+            <a:extLst>
+              <a:ext uri="{FF2B5EF4-FFF2-40B4-BE49-F238E27FC236}">
+                <a16:creationId xmlns:a16="http://schemas.microsoft.com/office/drawing/2014/main" id="{8D14D47D-E5E0-784F-AA91-A4E12BAD68DD}"/>
+              </a:ext>
+            </a:extLst>
+          </p:cNvPr>
+          <p:cNvCxnSpPr>
+            <a:cxnSpLocks/>
+            <a:endCxn id="36" idx="0"/>
+          </p:cNvCxnSpPr>
+          <p:nvPr/>
+        </p:nvCxnSpPr>
+        <p:spPr>
+          <a:xfrm rot="10800000" flipV="1">
+            <a:off x="3325483" y="6028267"/>
+            <a:ext cx="6123326" cy="576434"/>
+          </a:xfrm>
+          <a:prstGeom prst="bentConnector2">
+            <a:avLst/>
+          </a:prstGeom>
+        </p:spPr>
+        <p:style>
+          <a:lnRef idx="2">
+            <a:schemeClr val="accent1"/>
+          </a:lnRef>
+          <a:fillRef idx="0">
+            <a:schemeClr val="accent1"/>
+          </a:fillRef>
+          <a:effectRef idx="1">
+            <a:schemeClr val="accent1"/>
+          </a:effectRef>
+          <a:fontRef idx="minor">
+            <a:schemeClr val="tx1"/>
+          </a:fontRef>
+        </p:style>
+      </p:cxnSp>
+      <p:sp>
+        <p:nvSpPr>
+          <p:cNvPr id="40" name="TextBox 39">
+            <a:extLst>
+              <a:ext uri="{FF2B5EF4-FFF2-40B4-BE49-F238E27FC236}">
+                <a16:creationId xmlns:a16="http://schemas.microsoft.com/office/drawing/2014/main" id="{860E9D77-2257-D740-8F26-9D4FA00EF76E}"/>
+              </a:ext>
+            </a:extLst>
+          </p:cNvPr>
+          <p:cNvSpPr txBox="1"/>
+          <p:nvPr/>
+        </p:nvSpPr>
+        <p:spPr>
+          <a:xfrm>
+            <a:off x="6093675" y="6607331"/>
+            <a:ext cx="7148111" cy="1200329"/>
+          </a:xfrm>
+          <a:prstGeom prst="rect">
+            <a:avLst/>
+          </a:prstGeom>
+          <a:noFill/>
+          <a:ln>
+            <a:solidFill>
+              <a:schemeClr val="accent1"/>
+            </a:solidFill>
+          </a:ln>
+        </p:spPr>
+        <p:txBody>
+          <a:bodyPr wrap="none" rtlCol="0">
+            <a:spAutoFit/>
+          </a:bodyPr>
+          <a:lstStyle/>
+          <a:p>
+            <a:pPr algn="l"/>
+            <a:r>
+              <a:rPr lang="en-US" sz="1200" b="1" dirty="0">
+                <a:solidFill>
+                  <a:schemeClr val="accent1"/>
+                </a:solidFill>
+                <a:latin typeface="Amazon Ember" panose="020B0603020204020204" pitchFamily="34" charset="0"/>
+                <a:ea typeface="Amazon Ember" panose="020B0603020204020204" pitchFamily="34" charset="0"/>
+                <a:cs typeface="Amazon Ember" panose="020B0603020204020204" pitchFamily="34" charset="0"/>
+              </a:rPr>
+              <a:t>OnEnter, Publish IoT Topic:</a:t>
+            </a:r>
+          </a:p>
+          <a:p>
+            <a:r>
+              <a:rPr lang="en-US" sz="1200" dirty="0">
+                <a:latin typeface="Amazon Ember" panose="020B0603020204020204" pitchFamily="34" charset="0"/>
+                <a:ea typeface="Amazon Ember" panose="020B0603020204020204" pitchFamily="34" charset="0"/>
+                <a:cs typeface="Amazon Ember" panose="020B0603020204020204" pitchFamily="34" charset="0"/>
+              </a:rPr>
+              <a:t>Topic: tanks/tankLevelEvent</a:t>
+            </a:r>
+          </a:p>
+          <a:p>
+            <a:endParaRPr lang="en-US" sz="1200" dirty="0">
+              <a:latin typeface="Amazon Ember" panose="020B0603020204020204" pitchFamily="34" charset="0"/>
+              <a:ea typeface="Amazon Ember" panose="020B0603020204020204" pitchFamily="34" charset="0"/>
+              <a:cs typeface="Amazon Ember" panose="020B0603020204020204" pitchFamily="34" charset="0"/>
+            </a:endParaRPr>
+          </a:p>
+          <a:p>
+            <a:r>
+              <a:rPr lang="en-US" sz="1200" b="1" dirty="0">
+                <a:solidFill>
+                  <a:schemeClr val="accent1"/>
+                </a:solidFill>
+                <a:latin typeface="Amazon Ember" panose="020B0603020204020204" pitchFamily="34" charset="0"/>
+                <a:ea typeface="Amazon Ember" panose="020B0603020204020204" pitchFamily="34" charset="0"/>
+                <a:cs typeface="Amazon Ember" panose="020B0603020204020204" pitchFamily="34" charset="0"/>
+              </a:rPr>
+              <a:t>OnInput setVariables:</a:t>
+            </a:r>
+          </a:p>
+          <a:p>
+            <a:r>
+              <a:rPr lang="en-US" sz="1200" dirty="0">
+                <a:latin typeface="Amazon Ember" panose="020B0603020204020204" pitchFamily="34" charset="0"/>
+                <a:ea typeface="Amazon Ember" panose="020B0603020204020204" pitchFamily="34" charset="0"/>
+                <a:cs typeface="Amazon Ember" panose="020B0603020204020204" pitchFamily="34" charset="0"/>
+              </a:rPr>
+              <a:t>tankLevel = $input.tankLevel.sensorData.tankLevel</a:t>
+            </a:r>
+          </a:p>
+          <a:p>
+            <a:r>
+              <a:rPr lang="en-US" sz="1200" dirty="0">
+                <a:latin typeface="Amazon Ember" panose="020B0603020204020204" pitchFamily="34" charset="0"/>
+                <a:ea typeface="Amazon Ember" panose="020B0603020204020204" pitchFamily="34" charset="0"/>
+                <a:cs typeface="Amazon Ember" panose="020B0603020204020204" pitchFamily="34" charset="0"/>
+              </a:rPr>
+              <a:t>maxThresholdExceeded = false if $input.tankLevel.sensorData.tankLevel &lt;= $variable.maxThreshold</a:t>
+            </a:r>
+          </a:p>
+        </p:txBody>
+      </p:sp>
+      <p:cxnSp>
+        <p:nvCxnSpPr>
+          <p:cNvPr id="41" name="Straight Connector 7">
+            <a:extLst>
+              <a:ext uri="{FF2B5EF4-FFF2-40B4-BE49-F238E27FC236}">
+                <a16:creationId xmlns:a16="http://schemas.microsoft.com/office/drawing/2014/main" id="{B169931A-190F-BD47-B09F-C2F0E5A241D0}"/>
+              </a:ext>
+            </a:extLst>
+          </p:cNvPr>
+          <p:cNvCxnSpPr>
+            <a:cxnSpLocks/>
+            <a:endCxn id="40" idx="3"/>
+          </p:cNvCxnSpPr>
+          <p:nvPr/>
+        </p:nvCxnSpPr>
+        <p:spPr>
+          <a:xfrm rot="16200000" flipH="1">
+            <a:off x="11754746" y="5720456"/>
+            <a:ext cx="2516964" cy="457116"/>
+          </a:xfrm>
+          <a:prstGeom prst="bentConnector4">
+            <a:avLst>
+              <a:gd name="adj1" fmla="val 403"/>
+              <a:gd name="adj2" fmla="val 235210"/>
+            </a:avLst>
+          </a:prstGeom>
+        </p:spPr>
+        <p:style>
+          <a:lnRef idx="2">
+            <a:schemeClr val="accent1"/>
+          </a:lnRef>
+          <a:fillRef idx="0">
+            <a:schemeClr val="accent1"/>
+          </a:fillRef>
+          <a:effectRef idx="1">
+            <a:schemeClr val="accent1"/>
+          </a:effectRef>
+          <a:fontRef idx="minor">
+            <a:schemeClr val="tx1"/>
+          </a:fontRef>
+        </p:style>
+      </p:cxnSp>
+    </p:spTree>
+    <p:extLst>
+      <p:ext uri="{BB962C8B-B14F-4D97-AF65-F5344CB8AC3E}">
+        <p14:creationId xmlns:p14="http://schemas.microsoft.com/office/powerpoint/2010/main" val="753492399"/>
       </p:ext>
     </p:extLst>
   </p:cSld>
@@ -14522,12 +15329,9 @@
 </file>
 
 <file path=customXml/item1.xml><?xml version="1.0" encoding="utf-8"?>
-<?mso-contentType ?>
-<FormTemplates xmlns="http://schemas.microsoft.com/sharepoint/v3/contenttype/forms">
-  <Display>DocumentLibraryForm</Display>
-  <Edit>DocumentLibraryForm</Edit>
-  <New>DocumentLibraryForm</New>
-</FormTemplates>
+<p:properties xmlns:p="http://schemas.microsoft.com/office/2006/metadata/properties" xmlns:xsi="http://www.w3.org/2001/XMLSchema-instance">
+  <documentManagement/>
+</p:properties>
 </file>
 
 <file path=customXml/item2.xml><?xml version="1.0" encoding="utf-8"?>
@@ -14645,15 +15449,25 @@
 </file>
 
 <file path=customXml/item3.xml><?xml version="1.0" encoding="utf-8"?>
-<p:properties xmlns:p="http://schemas.microsoft.com/office/2006/metadata/properties" xmlns:xsi="http://www.w3.org/2001/XMLSchema-instance">
-  <documentManagement/>
-</p:properties>
+<?mso-contentType ?>
+<FormTemplates xmlns="http://schemas.microsoft.com/sharepoint/v3/contenttype/forms">
+  <Display>DocumentLibraryForm</Display>
+  <Edit>DocumentLibraryForm</Edit>
+  <New>DocumentLibraryForm</New>
+</FormTemplates>
 </file>
 
 <file path=customXml/itemProps1.xml><?xml version="1.0" encoding="utf-8"?>
-<ds:datastoreItem xmlns:ds="http://schemas.openxmlformats.org/officeDocument/2006/customXml" ds:itemID="{705B35A6-8B52-46A5-AE45-B98C6459DC10}">
+<ds:datastoreItem xmlns:ds="http://schemas.openxmlformats.org/officeDocument/2006/customXml" ds:itemID="{C597C89A-FD0C-431E-81F6-90225B937683}">
   <ds:schemaRefs>
-    <ds:schemaRef ds:uri="http://schemas.microsoft.com/sharepoint/v3/contenttype/forms"/>
+    <ds:schemaRef ds:uri="http://schemas.microsoft.com/office/infopath/2007/PartnerControls"/>
+    <ds:schemaRef ds:uri="http://www.w3.org/XML/1998/namespace"/>
+    <ds:schemaRef ds:uri="http://schemas.microsoft.com/office/2006/documentManagement/types"/>
+    <ds:schemaRef ds:uri="http://purl.org/dc/dcmitype/"/>
+    <ds:schemaRef ds:uri="http://schemas.openxmlformats.org/package/2006/metadata/core-properties"/>
+    <ds:schemaRef ds:uri="http://purl.org/dc/terms/"/>
+    <ds:schemaRef ds:uri="http://schemas.microsoft.com/office/2006/metadata/properties"/>
+    <ds:schemaRef ds:uri="http://purl.org/dc/elements/1.1/"/>
   </ds:schemaRefs>
 </ds:datastoreItem>
 </file>
@@ -14675,16 +15489,9 @@
 </file>
 
 <file path=customXml/itemProps3.xml><?xml version="1.0" encoding="utf-8"?>
-<ds:datastoreItem xmlns:ds="http://schemas.openxmlformats.org/officeDocument/2006/customXml" ds:itemID="{C597C89A-FD0C-431E-81F6-90225B937683}">
+<ds:datastoreItem xmlns:ds="http://schemas.openxmlformats.org/officeDocument/2006/customXml" ds:itemID="{705B35A6-8B52-46A5-AE45-B98C6459DC10}">
   <ds:schemaRefs>
-    <ds:schemaRef ds:uri="http://schemas.microsoft.com/office/infopath/2007/PartnerControls"/>
-    <ds:schemaRef ds:uri="http://www.w3.org/XML/1998/namespace"/>
-    <ds:schemaRef ds:uri="http://schemas.microsoft.com/office/2006/documentManagement/types"/>
-    <ds:schemaRef ds:uri="http://purl.org/dc/dcmitype/"/>
-    <ds:schemaRef ds:uri="http://schemas.openxmlformats.org/package/2006/metadata/core-properties"/>
-    <ds:schemaRef ds:uri="http://purl.org/dc/terms/"/>
-    <ds:schemaRef ds:uri="http://schemas.microsoft.com/office/2006/metadata/properties"/>
-    <ds:schemaRef ds:uri="http://purl.org/dc/elements/1.1/"/>
+    <ds:schemaRef ds:uri="http://schemas.microsoft.com/sharepoint/v3/contenttype/forms"/>
   </ds:schemaRefs>
 </ds:datastoreItem>
 </file>
</xml_diff>